<commit_message>
added modification to system block diagram ppt
</commit_message>
<xml_diff>
--- a/System_Block_Diagram.pptx
+++ b/System_Block_Diagram.pptx
@@ -126,7 +126,7 @@
   <pc:docChgLst>
     <pc:chgData name="Philip Wolfe" userId="bbe4321b1cd5c343" providerId="LiveId" clId="{D1B404D1-0DA3-47D9-95DB-43B7A83A3707}"/>
     <pc:docChg chg="undo redo custSel addSld delSld modSld sldOrd">
-      <pc:chgData name="Philip Wolfe" userId="bbe4321b1cd5c343" providerId="LiveId" clId="{D1B404D1-0DA3-47D9-95DB-43B7A83A3707}" dt="2017-11-30T02:53:22.599" v="2346"/>
+      <pc:chgData name="Philip Wolfe" userId="bbe4321b1cd5c343" providerId="LiveId" clId="{D1B404D1-0DA3-47D9-95DB-43B7A83A3707}" dt="2017-11-30T05:14:30.372" v="2352" actId="20577"/>
       <pc:docMkLst>
         <pc:docMk/>
       </pc:docMkLst>
@@ -1069,13 +1069,13 @@
         </pc:picChg>
       </pc:sldChg>
       <pc:sldChg chg="addSp delSp modSp add ord">
-        <pc:chgData name="Philip Wolfe" userId="bbe4321b1cd5c343" providerId="LiveId" clId="{D1B404D1-0DA3-47D9-95DB-43B7A83A3707}" dt="2017-11-30T02:52:41.057" v="2345" actId="20577"/>
+        <pc:chgData name="Philip Wolfe" userId="bbe4321b1cd5c343" providerId="LiveId" clId="{D1B404D1-0DA3-47D9-95DB-43B7A83A3707}" dt="2017-11-30T05:14:30.372" v="2352" actId="20577"/>
         <pc:sldMkLst>
           <pc:docMk/>
           <pc:sldMk cId="375640" sldId="262"/>
         </pc:sldMkLst>
         <pc:spChg chg="mod">
-          <ac:chgData name="Philip Wolfe" userId="bbe4321b1cd5c343" providerId="LiveId" clId="{D1B404D1-0DA3-47D9-95DB-43B7A83A3707}" dt="2017-11-18T22:25:50.719" v="1453" actId="1076"/>
+          <ac:chgData name="Philip Wolfe" userId="bbe4321b1cd5c343" providerId="LiveId" clId="{D1B404D1-0DA3-47D9-95DB-43B7A83A3707}" dt="2017-11-30T05:14:30.372" v="2352" actId="20577"/>
           <ac:spMkLst>
             <pc:docMk/>
             <pc:sldMk cId="375640" sldId="262"/>
@@ -8129,13 +8129,17 @@
         </p:spPr>
         <p:txBody>
           <a:bodyPr>
-            <a:normAutofit fontScale="90000"/>
+            <a:normAutofit/>
           </a:bodyPr>
           <a:lstStyle/>
           <a:p>
             <a:r>
+              <a:rPr lang="en-US" dirty="0" err="1"/>
+              <a:t>CheckPattern</a:t>
+            </a:r>
+            <a:r>
               <a:rPr lang="en-US" dirty="0"/>
-              <a:t>check_pattern overall arch</a:t>
+              <a:t> overall arch</a:t>
             </a:r>
           </a:p>
         </p:txBody>

</xml_diff>